<commit_message>
Added slide into presentation
</commit_message>
<xml_diff>
--- a/Zajecia2/C#.pptx
+++ b/Zajecia2/C#.pptx
@@ -9,10 +9,11 @@
     <p:sldId id="257" r:id="rId3"/>
     <p:sldId id="258" r:id="rId4"/>
     <p:sldId id="259" r:id="rId5"/>
-    <p:sldId id="260" r:id="rId6"/>
-    <p:sldId id="261" r:id="rId7"/>
-    <p:sldId id="262" r:id="rId8"/>
-    <p:sldId id="263" r:id="rId9"/>
+    <p:sldId id="264" r:id="rId6"/>
+    <p:sldId id="260" r:id="rId7"/>
+    <p:sldId id="261" r:id="rId8"/>
+    <p:sldId id="262" r:id="rId9"/>
+    <p:sldId id="263" r:id="rId10"/>
   </p:sldIdLst>
   <p:sldSz cx="12192000" cy="6858000"/>
   <p:notesSz cx="6858000" cy="9144000"/>
@@ -111,6 +112,11 @@
       </a:defRPr>
     </a:lvl9pPr>
   </p:defaultTextStyle>
+  <p:extLst>
+    <p:ext uri="{EFAFB233-063F-42B5-8137-9DF3F51BA10A}">
+      <p15:sldGuideLst xmlns:p15="http://schemas.microsoft.com/office/powerpoint/2012/main"/>
+    </p:ext>
+  </p:extLst>
 </p:presentation>
 </file>
 
@@ -6307,7 +6313,7 @@
           <p:cNvPr id="2" name="Title 1">
             <a:extLst>
               <a:ext uri="{FF2B5EF4-FFF2-40B4-BE49-F238E27FC236}">
-                <a16:creationId xmlns:a16="http://schemas.microsoft.com/office/drawing/2014/main" id="{616166C4-398D-4EDE-A612-5D050DA8EC80}"/>
+                <a16:creationId xmlns:a16="http://schemas.microsoft.com/office/drawing/2014/main" id="{771FBA44-775C-4215-8A30-0924966B593A}"/>
               </a:ext>
             </a:extLst>
           </p:cNvPr>
@@ -6318,20 +6324,32 @@
             <p:ph type="title"/>
           </p:nvPr>
         </p:nvSpPr>
-        <p:spPr>
-          <a:xfrm>
-            <a:off x="333376" y="-161925"/>
-            <a:ext cx="10131425" cy="1456267"/>
-          </a:xfrm>
-        </p:spPr>
+        <p:spPr/>
         <p:txBody>
           <a:bodyPr/>
           <a:lstStyle/>
           <a:p>
             <a:r>
-              <a:rPr lang="pl-PL" dirty="0"/>
-              <a:t>obiekty</a:t>
-            </a:r>
+              <a:rPr lang="en-US" dirty="0" err="1"/>
+              <a:t>Założenia</a:t>
+            </a:r>
+            <a:r>
+              <a:rPr lang="en-US" dirty="0"/>
+              <a:t> </a:t>
+            </a:r>
+            <a:r>
+              <a:rPr lang="en-US" dirty="0" err="1"/>
+              <a:t>programowania</a:t>
+            </a:r>
+            <a:r>
+              <a:rPr lang="en-US" dirty="0"/>
+              <a:t> </a:t>
+            </a:r>
+            <a:r>
+              <a:rPr lang="en-US" dirty="0" err="1"/>
+              <a:t>obiektowego</a:t>
+            </a:r>
+            <a:endParaRPr lang="pl-PL" dirty="0"/>
           </a:p>
         </p:txBody>
       </p:sp>
@@ -6340,7 +6358,7 @@
           <p:cNvPr id="5" name="Content Placeholder 4">
             <a:extLst>
               <a:ext uri="{FF2B5EF4-FFF2-40B4-BE49-F238E27FC236}">
-                <a16:creationId xmlns:a16="http://schemas.microsoft.com/office/drawing/2014/main" id="{2E5FD70E-455F-4663-A1F4-09AFBD36A623}"/>
+                <a16:creationId xmlns:a16="http://schemas.microsoft.com/office/drawing/2014/main" id="{93A2C575-A4E7-4DCF-8F68-6C6A0168B3D0}"/>
               </a:ext>
             </a:extLst>
           </p:cNvPr>
@@ -6365,15 +6383,15 @@
         </p:blipFill>
         <p:spPr>
           <a:xfrm>
-            <a:off x="333376" y="1070768"/>
-            <a:ext cx="9908130" cy="5606257"/>
+            <a:off x="1557619" y="2065867"/>
+            <a:ext cx="5948081" cy="4447293"/>
           </a:xfrm>
         </p:spPr>
       </p:pic>
     </p:spTree>
     <p:extLst>
       <p:ext uri="{BB962C8B-B14F-4D97-AF65-F5344CB8AC3E}">
-        <p14:creationId xmlns:p14="http://schemas.microsoft.com/office/powerpoint/2010/main" val="3423803826"/>
+        <p14:creationId xmlns:p14="http://schemas.microsoft.com/office/powerpoint/2010/main" val="2909464249"/>
       </p:ext>
     </p:extLst>
   </p:cSld>
@@ -6405,7 +6423,7 @@
           <p:cNvPr id="2" name="Title 1">
             <a:extLst>
               <a:ext uri="{FF2B5EF4-FFF2-40B4-BE49-F238E27FC236}">
-                <a16:creationId xmlns:a16="http://schemas.microsoft.com/office/drawing/2014/main" id="{D6360A8B-F37B-44B7-9A5D-FF603EBF8468}"/>
+                <a16:creationId xmlns:a16="http://schemas.microsoft.com/office/drawing/2014/main" id="{616166C4-398D-4EDE-A612-5D050DA8EC80}"/>
               </a:ext>
             </a:extLst>
           </p:cNvPr>
@@ -6418,7 +6436,7 @@
         </p:nvSpPr>
         <p:spPr>
           <a:xfrm>
-            <a:off x="590551" y="85725"/>
+            <a:off x="333376" y="-161925"/>
             <a:ext cx="10131425" cy="1456267"/>
           </a:xfrm>
         </p:spPr>
@@ -6428,17 +6446,17 @@
           <a:p>
             <a:r>
               <a:rPr lang="pl-PL" dirty="0"/>
-              <a:t>Obiekt a klasa</a:t>
+              <a:t>obiekty</a:t>
             </a:r>
           </a:p>
         </p:txBody>
       </p:sp>
       <p:pic>
         <p:nvPicPr>
-          <p:cNvPr id="4" name="Content Placeholder 3">
+          <p:cNvPr id="5" name="Content Placeholder 4">
             <a:extLst>
               <a:ext uri="{FF2B5EF4-FFF2-40B4-BE49-F238E27FC236}">
-                <a16:creationId xmlns:a16="http://schemas.microsoft.com/office/drawing/2014/main" id="{EA6C7BDF-300D-4DA9-8FDF-A282056E6ABD}"/>
+                <a16:creationId xmlns:a16="http://schemas.microsoft.com/office/drawing/2014/main" id="{2E5FD70E-455F-4663-A1F4-09AFBD36A623}"/>
               </a:ext>
             </a:extLst>
           </p:cNvPr>
@@ -6450,25 +6468,28 @@
           </p:nvPr>
         </p:nvPicPr>
         <p:blipFill>
-          <a:blip r:embed="rId2"/>
+          <a:blip r:embed="rId2">
+            <a:extLst>
+              <a:ext uri="{28A0092B-C50C-407E-A947-70E740481C1C}">
+                <a14:useLocalDpi xmlns:a14="http://schemas.microsoft.com/office/drawing/2010/main" val="0"/>
+              </a:ext>
+            </a:extLst>
+          </a:blip>
           <a:stretch>
             <a:fillRect/>
           </a:stretch>
         </p:blipFill>
         <p:spPr>
           <a:xfrm>
-            <a:off x="347597" y="1694392"/>
-            <a:ext cx="9434577" cy="5144610"/>
-          </a:xfrm>
-          <a:prstGeom prst="rect">
-            <a:avLst/>
-          </a:prstGeom>
+            <a:off x="333376" y="1070768"/>
+            <a:ext cx="9908130" cy="5606257"/>
+          </a:xfrm>
         </p:spPr>
       </p:pic>
     </p:spTree>
     <p:extLst>
       <p:ext uri="{BB962C8B-B14F-4D97-AF65-F5344CB8AC3E}">
-        <p14:creationId xmlns:p14="http://schemas.microsoft.com/office/powerpoint/2010/main" val="2233151194"/>
+        <p14:creationId xmlns:p14="http://schemas.microsoft.com/office/powerpoint/2010/main" val="3423803826"/>
       </p:ext>
     </p:extLst>
   </p:cSld>
@@ -6500,6 +6521,101 @@
           <p:cNvPr id="2" name="Title 1">
             <a:extLst>
               <a:ext uri="{FF2B5EF4-FFF2-40B4-BE49-F238E27FC236}">
+                <a16:creationId xmlns:a16="http://schemas.microsoft.com/office/drawing/2014/main" id="{D6360A8B-F37B-44B7-9A5D-FF603EBF8468}"/>
+              </a:ext>
+            </a:extLst>
+          </p:cNvPr>
+          <p:cNvSpPr>
+            <a:spLocks noGrp="1"/>
+          </p:cNvSpPr>
+          <p:nvPr>
+            <p:ph type="title"/>
+          </p:nvPr>
+        </p:nvSpPr>
+        <p:spPr>
+          <a:xfrm>
+            <a:off x="590551" y="85725"/>
+            <a:ext cx="10131425" cy="1456267"/>
+          </a:xfrm>
+        </p:spPr>
+        <p:txBody>
+          <a:bodyPr/>
+          <a:lstStyle/>
+          <a:p>
+            <a:r>
+              <a:rPr lang="pl-PL" dirty="0"/>
+              <a:t>Obiekt a klasa</a:t>
+            </a:r>
+          </a:p>
+        </p:txBody>
+      </p:sp>
+      <p:pic>
+        <p:nvPicPr>
+          <p:cNvPr id="4" name="Content Placeholder 3">
+            <a:extLst>
+              <a:ext uri="{FF2B5EF4-FFF2-40B4-BE49-F238E27FC236}">
+                <a16:creationId xmlns:a16="http://schemas.microsoft.com/office/drawing/2014/main" id="{EA6C7BDF-300D-4DA9-8FDF-A282056E6ABD}"/>
+              </a:ext>
+            </a:extLst>
+          </p:cNvPr>
+          <p:cNvPicPr>
+            <a:picLocks noGrp="1" noChangeAspect="1"/>
+          </p:cNvPicPr>
+          <p:nvPr>
+            <p:ph idx="1"/>
+          </p:nvPr>
+        </p:nvPicPr>
+        <p:blipFill>
+          <a:blip r:embed="rId2"/>
+          <a:stretch>
+            <a:fillRect/>
+          </a:stretch>
+        </p:blipFill>
+        <p:spPr>
+          <a:xfrm>
+            <a:off x="347597" y="1694392"/>
+            <a:ext cx="9434577" cy="5144610"/>
+          </a:xfrm>
+          <a:prstGeom prst="rect">
+            <a:avLst/>
+          </a:prstGeom>
+        </p:spPr>
+      </p:pic>
+    </p:spTree>
+    <p:extLst>
+      <p:ext uri="{BB962C8B-B14F-4D97-AF65-F5344CB8AC3E}">
+        <p14:creationId xmlns:p14="http://schemas.microsoft.com/office/powerpoint/2010/main" val="2233151194"/>
+      </p:ext>
+    </p:extLst>
+  </p:cSld>
+  <p:clrMapOvr>
+    <a:masterClrMapping/>
+  </p:clrMapOvr>
+</p:sld>
+</file>
+
+<file path=ppt/slides/slide8.xml><?xml version="1.0" encoding="utf-8"?>
+<p:sld xmlns:a="http://schemas.openxmlformats.org/drawingml/2006/main" xmlns:r="http://schemas.openxmlformats.org/officeDocument/2006/relationships" xmlns:p="http://schemas.openxmlformats.org/presentationml/2006/main">
+  <p:cSld>
+    <p:spTree>
+      <p:nvGrpSpPr>
+        <p:cNvPr id="1" name=""/>
+        <p:cNvGrpSpPr/>
+        <p:nvPr/>
+      </p:nvGrpSpPr>
+      <p:grpSpPr>
+        <a:xfrm>
+          <a:off x="0" y="0"/>
+          <a:ext cx="0" cy="0"/>
+          <a:chOff x="0" y="0"/>
+          <a:chExt cx="0" cy="0"/>
+        </a:xfrm>
+      </p:grpSpPr>
+      <p:sp>
+        <p:nvSpPr>
+          <p:cNvPr id="2" name="Title 1">
+            <a:extLst>
+              <a:ext uri="{FF2B5EF4-FFF2-40B4-BE49-F238E27FC236}">
                 <a16:creationId xmlns:a16="http://schemas.microsoft.com/office/drawing/2014/main" id="{612C7A5B-7459-4278-A7FA-206BD925552C}"/>
               </a:ext>
             </a:extLst>
@@ -6568,7 +6684,7 @@
 </p:sld>
 </file>
 
-<file path=ppt/slides/slide8.xml><?xml version="1.0" encoding="utf-8"?>
+<file path=ppt/slides/slide9.xml><?xml version="1.0" encoding="utf-8"?>
 <p:sld xmlns:a="http://schemas.openxmlformats.org/drawingml/2006/main" xmlns:r="http://schemas.openxmlformats.org/officeDocument/2006/relationships" xmlns:p="http://schemas.openxmlformats.org/presentationml/2006/main">
   <p:cSld>
     <p:spTree>

</xml_diff>